<commit_message>
module03 ready for release
</commit_message>
<xml_diff>
--- a/Slides/Lesson 2.1 Using a Template.pptx
+++ b/Slides/Lesson 2.1 Using a Template.pptx
@@ -269,7 +269,7 @@
             <a:fld id="{0FAC78B3-EDCE-4187-A1AE-28620314FA32}" type="datetimeFigureOut">
               <a:rPr lang="en-US" smtClean="0"/>
               <a:pPr/>
-              <a:t>8/13/2015</a:t>
+              <a:t>9/19/2015</a:t>
             </a:fld>
             <a:endParaRPr lang="en-US"/>
           </a:p>
@@ -907,7 +907,7 @@
           <a:p>
             <a:fld id="{AE36E179-9677-406E-90D9-3402BE92068A}" type="datetime1">
               <a:rPr lang="en-US" smtClean="0"/>
-              <a:t>8/13/2015</a:t>
+              <a:t>9/19/2015</a:t>
             </a:fld>
             <a:endParaRPr lang="en-US"/>
           </a:p>
@@ -1179,7 +1179,7 @@
           <a:p>
             <a:fld id="{9C106CB1-CEAE-4FA9-AC65-2E4B01C62B73}" type="datetime1">
               <a:rPr lang="en-US" smtClean="0"/>
-              <a:t>8/13/2015</a:t>
+              <a:t>9/19/2015</a:t>
             </a:fld>
             <a:endParaRPr lang="en-US"/>
           </a:p>
@@ -1361,7 +1361,7 @@
           <a:p>
             <a:fld id="{2D3DB8E0-41F1-4047-A2BB-3AF23AEFB7A8}" type="datetime1">
               <a:rPr lang="en-US" smtClean="0"/>
-              <a:t>8/13/2015</a:t>
+              <a:t>9/19/2015</a:t>
             </a:fld>
             <a:endParaRPr lang="en-US"/>
           </a:p>
@@ -1553,7 +1553,7 @@
           <a:p>
             <a:fld id="{2EDFADFF-E434-421D-BD26-7C347DAB516F}" type="datetime1">
               <a:rPr lang="en-US" smtClean="0"/>
-              <a:t>8/13/2015</a:t>
+              <a:t>9/19/2015</a:t>
             </a:fld>
             <a:endParaRPr lang="en-US"/>
           </a:p>
@@ -1747,7 +1747,7 @@
           <a:p>
             <a:fld id="{3B722677-7067-4D71-BF6A-8259C5E94357}" type="datetime1">
               <a:rPr lang="en-US" smtClean="0"/>
-              <a:t>8/13/2015</a:t>
+              <a:t>9/19/2015</a:t>
             </a:fld>
             <a:endParaRPr lang="en-US"/>
           </a:p>
@@ -2171,7 +2171,7 @@
           <a:p>
             <a:fld id="{0C6FD516-C588-49F9-8A09-31EF43101ACE}" type="datetime1">
               <a:rPr lang="en-US" smtClean="0"/>
-              <a:t>8/13/2015</a:t>
+              <a:t>9/19/2015</a:t>
             </a:fld>
             <a:endParaRPr lang="en-US"/>
           </a:p>
@@ -2471,7 +2471,7 @@
           <a:p>
             <a:fld id="{62847054-0C3A-4855-B827-AB022CCDB352}" type="datetime1">
               <a:rPr lang="en-US" smtClean="0"/>
-              <a:t>8/13/2015</a:t>
+              <a:t>9/19/2015</a:t>
             </a:fld>
             <a:endParaRPr lang="en-US"/>
           </a:p>
@@ -2912,7 +2912,7 @@
           <a:p>
             <a:fld id="{787C7470-D2BA-4210-A881-18C149229110}" type="datetime1">
               <a:rPr lang="en-US" smtClean="0"/>
-              <a:t>8/13/2015</a:t>
+              <a:t>9/19/2015</a:t>
             </a:fld>
             <a:endParaRPr lang="en-US"/>
           </a:p>
@@ -3042,7 +3042,7 @@
           <a:p>
             <a:fld id="{8DEC73FD-A5ED-479F-9068-BAD5EB3F7E69}" type="datetime1">
               <a:rPr lang="en-US" smtClean="0"/>
-              <a:t>8/13/2015</a:t>
+              <a:t>9/19/2015</a:t>
             </a:fld>
             <a:endParaRPr lang="en-US"/>
           </a:p>
@@ -3149,7 +3149,7 @@
           <a:p>
             <a:fld id="{EA1BC252-941B-4451-B02D-F879104EB58F}" type="datetime1">
               <a:rPr lang="en-US" smtClean="0"/>
-              <a:t>8/13/2015</a:t>
+              <a:t>9/19/2015</a:t>
             </a:fld>
             <a:endParaRPr lang="en-US"/>
           </a:p>
@@ -3438,7 +3438,7 @@
           <a:p>
             <a:fld id="{43A8641F-9EDF-4983-849A-96C94386CBBC}" type="datetime1">
               <a:rPr lang="en-US" smtClean="0"/>
-              <a:t>8/13/2015</a:t>
+              <a:t>9/19/2015</a:t>
             </a:fld>
             <a:endParaRPr lang="en-US"/>
           </a:p>

</xml_diff>